<commit_message>
zwischenpräsi final zu verschicken noch ohne fertigen anhang
</commit_message>
<xml_diff>
--- a/ppt/Zwischenpraesentation_v1.1.pptx
+++ b/ppt/Zwischenpraesentation_v1.1.pptx
@@ -10,7 +10,7 @@
     <p:sldId id="257" r:id="rId4"/>
     <p:sldId id="258" r:id="rId5"/>
     <p:sldId id="259" r:id="rId6"/>
-    <p:sldId id="850" r:id="rId7"/>
+    <p:sldId id="883" r:id="rId7"/>
     <p:sldId id="877" r:id="rId8"/>
     <p:sldId id="260" r:id="rId9"/>
     <p:sldId id="862" r:id="rId10"/>
@@ -9239,7 +9239,7 @@
                 <a:latin typeface="LMU CompatilFact"/>
                 <a:cs typeface="Times New Roman" panose="02020603050405020304" pitchFamily="18" charset="0"/>
               </a:rPr>
-              <a:t>Distanzmatrix</a:t>
+              <a:t>Distanzmetrik</a:t>
             </a:r>
             <a:endParaRPr lang="en-US" sz="2000" spc="-1" dirty="0">
               <a:latin typeface="LMU CompatilFact"/>
@@ -27091,6 +27091,43 @@
               </a:rPr>
               <a:t>Brezowsky</a:t>
             </a:r>
+            <a:endParaRPr lang="de-DE" sz="2400" spc="-1" dirty="0">
+              <a:solidFill>
+                <a:srgbClr val="000000"/>
+              </a:solidFill>
+              <a:latin typeface="LMU CompatilFact"/>
+            </a:endParaRPr>
+          </a:p>
+          <a:p>
+            <a:pPr marL="889200" lvl="1" indent="-323640">
+              <a:spcBef>
+                <a:spcPts val="1417"/>
+              </a:spcBef>
+              <a:buClr>
+                <a:srgbClr val="000000"/>
+              </a:buClr>
+              <a:buSzPct val="45000"/>
+              <a:buFont typeface="Wingdings" charset="2"/>
+              <a:buChar char=""/>
+            </a:pPr>
+            <a:r>
+              <a:rPr lang="de-DE" sz="2400" spc="-1" dirty="0">
+                <a:solidFill>
+                  <a:srgbClr val="000000"/>
+                </a:solidFill>
+                <a:latin typeface="LMU CompatilFact"/>
+              </a:rPr>
+              <a:t>29 GWL nach Hess &amp; </a:t>
+            </a:r>
+            <a:r>
+              <a:rPr lang="de-DE" sz="2400" spc="-1" dirty="0" err="1">
+                <a:solidFill>
+                  <a:srgbClr val="000000"/>
+                </a:solidFill>
+                <a:latin typeface="LMU CompatilFact"/>
+              </a:rPr>
+              <a:t>Brezowsky</a:t>
+            </a:r>
             <a:endParaRPr lang="en-US" sz="2400" spc="-1" dirty="0">
               <a:solidFill>
                 <a:srgbClr val="000000"/>
@@ -33933,150 +33970,12 @@
           </a:p>
         </p:txBody>
       </p:sp>
-      <p:sp>
-        <p:nvSpPr>
-          <p:cNvPr id="115" name="CustomShape 6"/>
-          <p:cNvSpPr/>
-          <p:nvPr/>
-        </p:nvSpPr>
-        <p:spPr>
-          <a:xfrm>
-            <a:off x="104040" y="2286000"/>
-            <a:ext cx="11554200" cy="3815640"/>
-          </a:xfrm>
-          <a:prstGeom prst="rect">
-            <a:avLst/>
-          </a:prstGeom>
-          <a:noFill/>
-          <a:ln w="9360">
-            <a:noFill/>
-          </a:ln>
-        </p:spPr>
-        <p:style>
-          <a:lnRef idx="0">
-            <a:scrgbClr r="0" g="0" b="0"/>
-          </a:lnRef>
-          <a:fillRef idx="0">
-            <a:scrgbClr r="0" g="0" b="0"/>
-          </a:fillRef>
-          <a:effectRef idx="0">
-            <a:scrgbClr r="0" g="0" b="0"/>
-          </a:effectRef>
-          <a:fontRef idx="minor"/>
-        </p:style>
-        <p:txBody>
-          <a:bodyPr lIns="90000" tIns="45000" rIns="90000" bIns="45000">
-            <a:noAutofit/>
-          </a:bodyPr>
-          <a:lstStyle/>
-          <a:p>
-            <a:pPr marL="108360">
-              <a:lnSpc>
-                <a:spcPct val="100000"/>
-              </a:lnSpc>
-              <a:spcBef>
-                <a:spcPts val="1417"/>
-              </a:spcBef>
-              <a:buClr>
-                <a:srgbClr val="000000"/>
-              </a:buClr>
-              <a:buSzPct val="45000"/>
-            </a:pPr>
-            <a:endParaRPr lang="en-US" sz="2400" b="0" strike="noStrike" spc="-1" dirty="0">
-              <a:latin typeface="Arial"/>
-            </a:endParaRPr>
-          </a:p>
-          <a:p>
-            <a:pPr marL="864000" lvl="1" indent="-323640">
-              <a:lnSpc>
-                <a:spcPct val="100000"/>
-              </a:lnSpc>
-              <a:spcBef>
-                <a:spcPts val="1134"/>
-              </a:spcBef>
-              <a:buClr>
-                <a:srgbClr val="000000"/>
-              </a:buClr>
-              <a:buSzPct val="75000"/>
-              <a:buFont typeface="Symbol"/>
-              <a:buChar char=""/>
-            </a:pPr>
-            <a:endParaRPr lang="en-US" sz="1600" b="0" strike="noStrike" spc="-1" dirty="0">
-              <a:latin typeface="Arial"/>
-            </a:endParaRPr>
-          </a:p>
-        </p:txBody>
-      </p:sp>
-      <p:sp>
-        <p:nvSpPr>
-          <p:cNvPr id="116" name="CustomShape 7"/>
-          <p:cNvSpPr/>
-          <p:nvPr/>
-        </p:nvSpPr>
-        <p:spPr>
-          <a:xfrm>
-            <a:off x="318600" y="1304640"/>
-            <a:ext cx="11554200" cy="757440"/>
-          </a:xfrm>
-          <a:prstGeom prst="rect">
-            <a:avLst/>
-          </a:prstGeom>
-          <a:noFill/>
-          <a:ln w="0">
-            <a:noFill/>
-          </a:ln>
-        </p:spPr>
-        <p:style>
-          <a:lnRef idx="0">
-            <a:scrgbClr r="0" g="0" b="0"/>
-          </a:lnRef>
-          <a:fillRef idx="0">
-            <a:scrgbClr r="0" g="0" b="0"/>
-          </a:fillRef>
-          <a:effectRef idx="0">
-            <a:scrgbClr r="0" g="0" b="0"/>
-          </a:effectRef>
-          <a:fontRef idx="minor"/>
-        </p:style>
-        <p:txBody>
-          <a:bodyPr lIns="90000" tIns="45000" rIns="90000" bIns="45000">
-            <a:noAutofit/>
-          </a:bodyPr>
-          <a:lstStyle/>
-          <a:p>
-            <a:pPr>
-              <a:lnSpc>
-                <a:spcPct val="100000"/>
-              </a:lnSpc>
-              <a:spcAft>
-                <a:spcPts val="601"/>
-              </a:spcAft>
-              <a:tabLst>
-                <a:tab pos="0" algn="l"/>
-              </a:tabLst>
-            </a:pPr>
-            <a:r>
-              <a:rPr lang="de-DE" sz="4800" b="1" strike="noStrike" spc="-1" dirty="0">
-                <a:solidFill>
-                  <a:srgbClr val="000000"/>
-                </a:solidFill>
-                <a:latin typeface="LMU CompatilFact"/>
-                <a:ea typeface="DejaVu Sans"/>
-              </a:rPr>
-              <a:t>Beispiel Großwetterlage</a:t>
-            </a:r>
-            <a:endParaRPr lang="en-US" sz="4800" b="0" strike="noStrike" spc="-1" dirty="0">
-              <a:latin typeface="Arial"/>
-            </a:endParaRPr>
-          </a:p>
-        </p:txBody>
-      </p:sp>
       <p:pic>
         <p:nvPicPr>
-          <p:cNvPr id="3" name="Grafik 2">
+          <p:cNvPr id="7" name="Grafik 6" descr="Ein Bild, das Tisch enthält.&#10;&#10;Automatisch generierte Beschreibung">
             <a:extLst>
               <a:ext uri="{FF2B5EF4-FFF2-40B4-BE49-F238E27FC236}">
-                <a16:creationId xmlns:a16="http://schemas.microsoft.com/office/drawing/2014/main" id="{44C475C2-EADF-4C78-B030-8026BDB26EC5}"/>
+                <a16:creationId xmlns:a16="http://schemas.microsoft.com/office/drawing/2014/main" id="{AECE362D-EB95-4D03-BAFA-C2C562CBBB39}"/>
               </a:ext>
             </a:extLst>
           </p:cNvPr>
@@ -34099,20 +33998,89 @@
         </p:blipFill>
         <p:spPr>
           <a:xfrm>
-            <a:off x="507960" y="2138306"/>
-            <a:ext cx="6015572" cy="4111028"/>
+            <a:off x="507960" y="2502230"/>
+            <a:ext cx="7892577" cy="2293691"/>
           </a:xfrm>
           <a:prstGeom prst="rect">
             <a:avLst/>
           </a:prstGeom>
         </p:spPr>
       </p:pic>
+      <p:sp>
+        <p:nvSpPr>
+          <p:cNvPr id="15" name="CustomShape 7">
+            <a:extLst>
+              <a:ext uri="{FF2B5EF4-FFF2-40B4-BE49-F238E27FC236}">
+                <a16:creationId xmlns:a16="http://schemas.microsoft.com/office/drawing/2014/main" id="{17235F56-5E8A-4606-9361-13FF52EE5168}"/>
+              </a:ext>
+            </a:extLst>
+          </p:cNvPr>
+          <p:cNvSpPr/>
+          <p:nvPr/>
+        </p:nvSpPr>
+        <p:spPr>
+          <a:xfrm>
+            <a:off x="318600" y="1304640"/>
+            <a:ext cx="11554200" cy="757440"/>
+          </a:xfrm>
+          <a:prstGeom prst="rect">
+            <a:avLst/>
+          </a:prstGeom>
+          <a:noFill/>
+          <a:ln w="0">
+            <a:noFill/>
+          </a:ln>
+        </p:spPr>
+        <p:style>
+          <a:lnRef idx="0">
+            <a:scrgbClr r="0" g="0" b="0"/>
+          </a:lnRef>
+          <a:fillRef idx="0">
+            <a:scrgbClr r="0" g="0" b="0"/>
+          </a:fillRef>
+          <a:effectRef idx="0">
+            <a:scrgbClr r="0" g="0" b="0"/>
+          </a:effectRef>
+          <a:fontRef idx="minor"/>
+        </p:style>
+        <p:txBody>
+          <a:bodyPr lIns="90000" tIns="45000" rIns="90000" bIns="45000">
+            <a:noAutofit/>
+          </a:bodyPr>
+          <a:lstStyle/>
+          <a:p>
+            <a:pPr>
+              <a:lnSpc>
+                <a:spcPct val="100000"/>
+              </a:lnSpc>
+              <a:spcAft>
+                <a:spcPts val="601"/>
+              </a:spcAft>
+              <a:tabLst>
+                <a:tab pos="0" algn="l"/>
+              </a:tabLst>
+            </a:pPr>
+            <a:r>
+              <a:rPr lang="de-DE" sz="4800" b="1" spc="-1" dirty="0">
+                <a:solidFill>
+                  <a:srgbClr val="000000"/>
+                </a:solidFill>
+                <a:latin typeface="LMU CompatilFact"/>
+              </a:rPr>
+              <a:t>Großwetterlagen Beispiele</a:t>
+            </a:r>
+            <a:endParaRPr lang="en-US" sz="4800" b="0" strike="noStrike" spc="-1" dirty="0">
+              <a:latin typeface="Arial"/>
+            </a:endParaRPr>
+          </a:p>
+        </p:txBody>
+      </p:sp>
       <p:pic>
         <p:nvPicPr>
-          <p:cNvPr id="5" name="Grafik 4">
+          <p:cNvPr id="9" name="Grafik 8">
             <a:extLst>
               <a:ext uri="{FF2B5EF4-FFF2-40B4-BE49-F238E27FC236}">
-                <a16:creationId xmlns:a16="http://schemas.microsoft.com/office/drawing/2014/main" id="{74144C31-5085-4D0D-B6F5-4A1123F76200}"/>
+                <a16:creationId xmlns:a16="http://schemas.microsoft.com/office/drawing/2014/main" id="{D90D0CE3-6065-4D66-9253-AA17A2ABFB07}"/>
               </a:ext>
             </a:extLst>
           </p:cNvPr>
@@ -34135,8 +34103,8 @@
         </p:blipFill>
         <p:spPr>
           <a:xfrm>
-            <a:off x="6523532" y="2138306"/>
-            <a:ext cx="1300665" cy="4111028"/>
+            <a:off x="507960" y="5367596"/>
+            <a:ext cx="7078173" cy="564517"/>
           </a:xfrm>
           <a:prstGeom prst="rect">
             <a:avLst/>
@@ -34145,10 +34113,10 @@
       </p:pic>
       <p:sp>
         <p:nvSpPr>
-          <p:cNvPr id="6" name="Textfeld 5">
+          <p:cNvPr id="10" name="Textfeld 9">
             <a:extLst>
               <a:ext uri="{FF2B5EF4-FFF2-40B4-BE49-F238E27FC236}">
-                <a16:creationId xmlns:a16="http://schemas.microsoft.com/office/drawing/2014/main" id="{F987B254-FE9D-4078-90AB-E8D6B47BFB6A}"/>
+                <a16:creationId xmlns:a16="http://schemas.microsoft.com/office/drawing/2014/main" id="{A53CBF8E-4482-4FA5-A72B-466869833B7D}"/>
               </a:ext>
             </a:extLst>
           </p:cNvPr>
@@ -34157,8 +34125,8 @@
         </p:nvSpPr>
         <p:spPr>
           <a:xfrm>
-            <a:off x="6570064" y="6427198"/>
-            <a:ext cx="4721389" cy="369332"/>
+            <a:off x="507960" y="4756488"/>
+            <a:ext cx="745107" cy="461665"/>
           </a:xfrm>
           <a:prstGeom prst="rect">
             <a:avLst/>
@@ -34172,8 +34140,8 @@
           <a:lstStyle/>
           <a:p>
             <a:r>
-              <a:rPr lang="de-DE" dirty="0"/>
-              <a:t>https://www.wetter.net/grosswetterlagenkarte</a:t>
+              <a:rPr lang="de-DE" sz="2400" dirty="0"/>
+              <a:t>…</a:t>
             </a:r>
           </a:p>
         </p:txBody>
@@ -34181,7 +34149,7 @@
     </p:spTree>
     <p:extLst>
       <p:ext uri="{BB962C8B-B14F-4D97-AF65-F5344CB8AC3E}">
-        <p14:creationId xmlns:p14="http://schemas.microsoft.com/office/powerpoint/2010/main" val="1063533009"/>
+        <p14:creationId xmlns:p14="http://schemas.microsoft.com/office/powerpoint/2010/main" val="3256237995"/>
       </p:ext>
     </p:extLst>
   </p:cSld>
@@ -34988,8 +34956,8 @@
           </a:p>
         </p:txBody>
       </p:sp>
-      <mc:AlternateContent xmlns:mc="http://schemas.openxmlformats.org/markup-compatibility/2006" xmlns:a14="http://schemas.microsoft.com/office/drawing/2010/main">
-        <mc:Choice Requires="a14">
+      <mc:AlternateContent xmlns:mc="http://schemas.openxmlformats.org/markup-compatibility/2006">
+        <mc:Choice xmlns:a14="http://schemas.microsoft.com/office/drawing/2010/main" Requires="a14">
           <p:sp>
             <p:nvSpPr>
               <p:cNvPr id="122" name="CustomShape 6"/>
@@ -35104,7 +35072,25 @@
                     </a:solidFill>
                     <a:latin typeface="LMU CompatilFact"/>
                   </a:rPr>
-                  <a:t>Luftdruck auf Meeresspiegelhöhe (</a:t>
+                  <a:t>Luftdruck in </a:t>
+                </a:r>
+                <a:r>
+                  <a:rPr lang="de-DE" sz="2000" b="0" strike="noStrike" spc="-1" dirty="0" err="1">
+                    <a:solidFill>
+                      <a:srgbClr val="000000"/>
+                    </a:solidFill>
+                    <a:latin typeface="LMU CompatilFact"/>
+                  </a:rPr>
+                  <a:t>Pa</a:t>
+                </a:r>
+                <a:r>
+                  <a:rPr lang="de-DE" sz="2000" b="0" strike="noStrike" spc="-1" dirty="0">
+                    <a:solidFill>
+                      <a:srgbClr val="000000"/>
+                    </a:solidFill>
+                    <a:latin typeface="LMU CompatilFact"/>
+                  </a:rPr>
+                  <a:t> auf Meeresspiegelhöhe (</a:t>
                 </a:r>
                 <a:r>
                   <a:rPr lang="de-DE" sz="2000" b="0" strike="noStrike" spc="-1" dirty="0" err="1">
@@ -35268,7 +35254,29 @@
                   </a:rPr>
                   <a:t>Für die Jahre 1900 bis 2010</a:t>
                 </a:r>
-                <a:endParaRPr lang="en-US" sz="2000" b="0" strike="noStrike" spc="-1" dirty="0">
+              </a:p>
+              <a:p>
+                <a:pPr marL="864000" lvl="1" indent="-323640">
+                  <a:spcBef>
+                    <a:spcPts val="1134"/>
+                  </a:spcBef>
+                  <a:buClr>
+                    <a:srgbClr val="000000"/>
+                  </a:buClr>
+                  <a:buSzPct val="75000"/>
+                  <a:buFont typeface="Symbol"/>
+                  <a:buChar char=""/>
+                </a:pPr>
+                <a:r>
+                  <a:rPr lang="de-DE" sz="2000" spc="-1" dirty="0">
+                    <a:solidFill>
+                      <a:srgbClr val="000000"/>
+                    </a:solidFill>
+                    <a:latin typeface="LMU CompatilFact"/>
+                  </a:rPr>
+                  <a:t>Ohne Information zur herrschenden GWL am Tag</a:t>
+                </a:r>
+                <a:endParaRPr lang="en-US" sz="2000" spc="-1" dirty="0">
                   <a:latin typeface="LMU CompatilFact"/>
                 </a:endParaRPr>
               </a:p>
@@ -35318,38 +35326,10 @@
                   <a:latin typeface="LMU CompatilFact"/>
                 </a:endParaRPr>
               </a:p>
-              <a:p>
-                <a:pPr marL="864000" lvl="1" indent="-323640">
-                  <a:lnSpc>
-                    <a:spcPct val="100000"/>
-                  </a:lnSpc>
-                  <a:spcBef>
-                    <a:spcPts val="1134"/>
-                  </a:spcBef>
-                  <a:buClr>
-                    <a:srgbClr val="000000"/>
-                  </a:buClr>
-                  <a:buSzPct val="75000"/>
-                  <a:buFont typeface="Symbol"/>
-                  <a:buChar char=""/>
-                </a:pPr>
-                <a:r>
-                  <a:rPr lang="de-DE" sz="2000" b="0" strike="noStrike" spc="-1" dirty="0">
-                    <a:solidFill>
-                      <a:srgbClr val="000000"/>
-                    </a:solidFill>
-                    <a:latin typeface="LMU CompatilFact"/>
-                  </a:rPr>
-                  <a:t>Ohne Information zur herrschenden GWL am Tag</a:t>
-                </a:r>
-                <a:endParaRPr lang="en-US" sz="2000" b="0" strike="noStrike" spc="-1" dirty="0">
-                  <a:latin typeface="LMU CompatilFact"/>
-                </a:endParaRPr>
-              </a:p>
             </p:txBody>
           </p:sp>
         </mc:Choice>
-        <mc:Fallback xmlns="">
+        <mc:Fallback>
           <p:sp>
             <p:nvSpPr>
               <p:cNvPr id="122" name="CustomShape 6"/>

</xml_diff>